<commit_message>
updates to final submit
</commit_message>
<xml_diff>
--- a/The Spectacular Sailors/Checkpoint_2/src/Final Draft as of 10.25.pptx
+++ b/The Spectacular Sailors/Checkpoint_2/src/Final Draft as of 10.25.pptx
@@ -3332,7 +3332,7 @@
           <p:cNvPr id="0" name="slide1">
             <a:extLst>
               <a:ext uri="{FF2B5EF4-FFF2-40B4-BE49-F238E27FC236}">
-                <a16:creationId xmlns:a16="http://schemas.microsoft.com/office/drawing/2014/main" id="{7C45B418-E987-49D7-8FF3-93260DA08474}"/>
+                <a16:creationId xmlns:a16="http://schemas.microsoft.com/office/drawing/2014/main" id="{DC8CF62A-8007-4DDE-811E-68C768B75716}"/>
               </a:ext>
             </a:extLst>
           </p:cNvPr>
@@ -3360,7 +3360,7 @@
           <p:cNvPr id="1" name="slide1">
             <a:extLst>
               <a:ext uri="{FF2B5EF4-FFF2-40B4-BE49-F238E27FC236}">
-                <a16:creationId xmlns:a16="http://schemas.microsoft.com/office/drawing/2014/main" id="{803AFC1B-BCA6-4AA3-822B-CB506F8C1DAB}"/>
+                <a16:creationId xmlns:a16="http://schemas.microsoft.com/office/drawing/2014/main" id="{D4F23460-995C-41B1-9F77-16E1D56F8079}"/>
               </a:ext>
             </a:extLst>
           </p:cNvPr>
@@ -3378,7 +3378,7 @@
           <a:p>
             <a:r>
               <a:rPr/>
-              <a:t>File created on: 10/26/20 3:49:58 PM EDT</a:t>
+              <a:t>File created on: 10/26/20 5:26:18 PM EDT</a:t>
             </a:r>
           </a:p>
         </p:txBody>
@@ -3418,7 +3418,7 @@
           <p:cNvPr descr="Story 11" id="2" name="slide2">
             <a:extLst>
               <a:ext uri="{FF2B5EF4-FFF2-40B4-BE49-F238E27FC236}">
-                <a16:creationId xmlns:a16="http://schemas.microsoft.com/office/drawing/2014/main" id="{F88FC441-C720-4D70-9B3F-2DC02F947DDD}"/>
+                <a16:creationId xmlns:a16="http://schemas.microsoft.com/office/drawing/2014/main" id="{7457DF06-3B26-4E99-A793-B67D63F5870D}"/>
               </a:ext>
             </a:extLst>
           </p:cNvPr>
@@ -3484,7 +3484,7 @@
           <p:cNvPr descr="Story 12" id="3" name="slide3">
             <a:extLst>
               <a:ext uri="{FF2B5EF4-FFF2-40B4-BE49-F238E27FC236}">
-                <a16:creationId xmlns:a16="http://schemas.microsoft.com/office/drawing/2014/main" id="{CFB8D0AB-C648-43F4-8EAC-F27ADB75BC7A}"/>
+                <a16:creationId xmlns:a16="http://schemas.microsoft.com/office/drawing/2014/main" id="{A89C7D7B-2E43-4497-94D6-D25607020BC6}"/>
               </a:ext>
             </a:extLst>
           </p:cNvPr>
@@ -3550,7 +3550,7 @@
           <p:cNvPr descr="Story 14" id="4" name="slide4">
             <a:extLst>
               <a:ext uri="{FF2B5EF4-FFF2-40B4-BE49-F238E27FC236}">
-                <a16:creationId xmlns:a16="http://schemas.microsoft.com/office/drawing/2014/main" id="{17B40318-79A0-43AD-B23B-BADAC17278CD}"/>
+                <a16:creationId xmlns:a16="http://schemas.microsoft.com/office/drawing/2014/main" id="{A2D3E94D-C3EB-405B-8725-3C6661CE42E3}"/>
               </a:ext>
             </a:extLst>
           </p:cNvPr>
@@ -3616,7 +3616,7 @@
           <p:cNvPr descr="Story 13" id="5" name="slide5">
             <a:extLst>
               <a:ext uri="{FF2B5EF4-FFF2-40B4-BE49-F238E27FC236}">
-                <a16:creationId xmlns:a16="http://schemas.microsoft.com/office/drawing/2014/main" id="{F8DCD6B0-A07E-4099-A1D4-CF01BC2B4B46}"/>
+                <a16:creationId xmlns:a16="http://schemas.microsoft.com/office/drawing/2014/main" id="{B50F9D9F-4D26-43C5-917D-FE45D0CA0AEE}"/>
               </a:ext>
             </a:extLst>
           </p:cNvPr>
@@ -3682,7 +3682,7 @@
           <p:cNvPr descr="Story 15" id="6" name="slide6">
             <a:extLst>
               <a:ext uri="{FF2B5EF4-FFF2-40B4-BE49-F238E27FC236}">
-                <a16:creationId xmlns:a16="http://schemas.microsoft.com/office/drawing/2014/main" id="{F2B48A93-2623-4536-856C-FB35E14CB01D}"/>
+                <a16:creationId xmlns:a16="http://schemas.microsoft.com/office/drawing/2014/main" id="{D051246B-5A56-4498-93FD-C0BF1A12D042}"/>
               </a:ext>
             </a:extLst>
           </p:cNvPr>
@@ -3745,10 +3745,10 @@
       </p:grpSpPr>
       <p:pic>
         <p:nvPicPr>
-          <p:cNvPr descr="Story 16" id="7" name="slide7">
-            <a:extLst>
-              <a:ext uri="{FF2B5EF4-FFF2-40B4-BE49-F238E27FC236}">
-                <a16:creationId xmlns:a16="http://schemas.microsoft.com/office/drawing/2014/main" id="{F261C71D-2EAA-4FFA-8B38-A0CC2F80A2FA}"/>
+          <p:cNvPr descr="Story 17" id="7" name="slide7">
+            <a:extLst>
+              <a:ext uri="{FF2B5EF4-FFF2-40B4-BE49-F238E27FC236}">
+                <a16:creationId xmlns:a16="http://schemas.microsoft.com/office/drawing/2014/main" id="{C760964F-7F4F-4225-8DD4-7BE5AF4CE1AF}"/>
               </a:ext>
             </a:extLst>
           </p:cNvPr>

</xml_diff>